<commit_message>
finished 5 method 2
</commit_message>
<xml_diff>
--- a/miniproject2_guide.pptx
+++ b/miniproject2_guide.pptx
@@ -144,6 +144,35 @@
 </p:presentation>
 </file>
 
+<file path=ppt/changesInfos/changesInfo1.xml><?xml version="1.0" encoding="utf-8"?>
+<pc:chgInfo xmlns:a="http://schemas.openxmlformats.org/drawingml/2006/main" xmlns:r="http://schemas.openxmlformats.org/officeDocument/2006/relationships" xmlns:ac="http://schemas.microsoft.com/office/drawing/2013/main/command" xmlns:pc="http://schemas.microsoft.com/office/powerpoint/2013/main/command">
+  <pc:docChgLst>
+    <pc:chgData name="Ma, Jeffrey J." userId="bf77436f-5d8b-4cea-b6f5-b8040540e6f5" providerId="ADAL" clId="{1B6F01B9-D6B7-5C4F-8A7F-21B3731E1E3A}"/>
+    <pc:docChg chg="modSld">
+      <pc:chgData name="Ma, Jeffrey J." userId="bf77436f-5d8b-4cea-b6f5-b8040540e6f5" providerId="ADAL" clId="{1B6F01B9-D6B7-5C4F-8A7F-21B3731E1E3A}" dt="2020-02-27T10:05:23.143" v="0" actId="1076"/>
+      <pc:docMkLst>
+        <pc:docMk/>
+      </pc:docMkLst>
+      <pc:sldChg chg="modSp">
+        <pc:chgData name="Ma, Jeffrey J." userId="bf77436f-5d8b-4cea-b6f5-b8040540e6f5" providerId="ADAL" clId="{1B6F01B9-D6B7-5C4F-8A7F-21B3731E1E3A}" dt="2020-02-27T10:05:23.143" v="0" actId="1076"/>
+        <pc:sldMkLst>
+          <pc:docMk/>
+          <pc:sldMk cId="1014937875" sldId="268"/>
+        </pc:sldMkLst>
+        <pc:graphicFrameChg chg="mod">
+          <ac:chgData name="Ma, Jeffrey J." userId="bf77436f-5d8b-4cea-b6f5-b8040540e6f5" providerId="ADAL" clId="{1B6F01B9-D6B7-5C4F-8A7F-21B3731E1E3A}" dt="2020-02-27T10:05:23.143" v="0" actId="1076"/>
+          <ac:graphicFrameMkLst>
+            <pc:docMk/>
+            <pc:sldMk cId="1014937875" sldId="268"/>
+            <ac:graphicFrameMk id="6" creationId="{00000000-0000-0000-0000-000000000000}"/>
+          </ac:graphicFrameMkLst>
+        </pc:graphicFrameChg>
+      </pc:sldChg>
+    </pc:docChg>
+  </pc:docChgLst>
+</pc:chgInfo>
+</file>
+
 <file path=ppt/handoutMasters/handoutMaster1.xml><?xml version="1.0" encoding="utf-8"?>
 <p:handoutMaster xmlns:a="http://schemas.openxmlformats.org/drawingml/2006/main" xmlns:r="http://schemas.openxmlformats.org/officeDocument/2006/relationships" xmlns:p="http://schemas.openxmlformats.org/presentationml/2006/main">
   <p:cSld>
@@ -226,7 +255,7 @@
           <a:p>
             <a:fld id="{0918F070-10D7-B04C-89FC-5B4AD48ABD2F}" type="datetimeFigureOut">
               <a:rPr lang="en-US" smtClean="0"/>
-              <a:t>2/19/2020</a:t>
+              <a:t>2/26/20</a:t>
             </a:fld>
             <a:endParaRPr lang="en-US"/>
           </a:p>
@@ -392,7 +421,7 @@
           <a:p>
             <a:fld id="{BE48478B-6CB6-1648-AD11-4BCA276D364A}" type="datetimeFigureOut">
               <a:rPr lang="en-US" smtClean="0"/>
-              <a:t>2/19/2020</a:t>
+              <a:t>2/26/20</a:t>
             </a:fld>
             <a:endParaRPr lang="en-US"/>
           </a:p>
@@ -869,14 +898,13 @@
               <a:t>Step-By-Step Instructions for </a:t>
             </a:r>
             <a:r>
-              <a:rPr lang="en-US" dirty="0" err="1" smtClean="0"/>
+              <a:rPr lang="en-US" dirty="0" err="1"/>
               <a:t>Miniproject</a:t>
             </a:r>
             <a:r>
-              <a:rPr lang="en-US" dirty="0" smtClean="0"/>
+              <a:rPr lang="en-US" dirty="0"/>
               <a:t> 2</a:t>
             </a:r>
-            <a:endParaRPr lang="en-US" dirty="0"/>
           </a:p>
         </p:txBody>
       </p:sp>
@@ -1053,14 +1081,13 @@
               <a:t>Step-By-Step Instructions for </a:t>
             </a:r>
             <a:r>
-              <a:rPr lang="en-US" dirty="0" err="1" smtClean="0"/>
+              <a:rPr lang="en-US" dirty="0" err="1"/>
               <a:t>Miniproject</a:t>
             </a:r>
             <a:r>
-              <a:rPr lang="en-US" dirty="0" smtClean="0"/>
+              <a:rPr lang="en-US" dirty="0"/>
               <a:t> 2</a:t>
             </a:r>
-            <a:endParaRPr lang="en-US" dirty="0"/>
           </a:p>
         </p:txBody>
       </p:sp>
@@ -1247,14 +1274,13 @@
               <a:t>Step-By-Step Instructions for </a:t>
             </a:r>
             <a:r>
-              <a:rPr lang="en-US" dirty="0" err="1" smtClean="0"/>
+              <a:rPr lang="en-US" dirty="0" err="1"/>
               <a:t>Miniproject</a:t>
             </a:r>
             <a:r>
-              <a:rPr lang="en-US" dirty="0" smtClean="0"/>
+              <a:rPr lang="en-US" dirty="0"/>
               <a:t> 2</a:t>
             </a:r>
-            <a:endParaRPr lang="en-US" dirty="0"/>
           </a:p>
         </p:txBody>
       </p:sp>
@@ -1439,14 +1465,13 @@
               <a:t>Step-By-Step Instructions for </a:t>
             </a:r>
             <a:r>
-              <a:rPr lang="en-US" dirty="0" err="1" smtClean="0"/>
+              <a:rPr lang="en-US" dirty="0" err="1"/>
               <a:t>Miniproject</a:t>
             </a:r>
             <a:r>
-              <a:rPr lang="en-US" dirty="0" smtClean="0"/>
+              <a:rPr lang="en-US" dirty="0"/>
               <a:t> 2</a:t>
             </a:r>
-            <a:endParaRPr lang="en-US" dirty="0"/>
           </a:p>
         </p:txBody>
       </p:sp>
@@ -1700,14 +1725,13 @@
               <a:t>Step-By-Step Instructions for </a:t>
             </a:r>
             <a:r>
-              <a:rPr lang="en-US" dirty="0" err="1" smtClean="0"/>
+              <a:rPr lang="en-US" dirty="0" err="1"/>
               <a:t>Miniproject</a:t>
             </a:r>
             <a:r>
-              <a:rPr lang="en-US" dirty="0" smtClean="0"/>
+              <a:rPr lang="en-US" dirty="0"/>
               <a:t> 2</a:t>
             </a:r>
-            <a:endParaRPr lang="en-US" dirty="0"/>
           </a:p>
         </p:txBody>
       </p:sp>
@@ -2001,14 +2025,13 @@
               <a:t>Step-By-Step Instructions for </a:t>
             </a:r>
             <a:r>
-              <a:rPr lang="en-US" dirty="0" err="1" smtClean="0"/>
+              <a:rPr lang="en-US" dirty="0" err="1"/>
               <a:t>Miniproject</a:t>
             </a:r>
             <a:r>
-              <a:rPr lang="en-US" dirty="0" smtClean="0"/>
+              <a:rPr lang="en-US" dirty="0"/>
               <a:t> 2</a:t>
             </a:r>
-            <a:endParaRPr lang="en-US" dirty="0"/>
           </a:p>
         </p:txBody>
       </p:sp>
@@ -2436,14 +2459,13 @@
               <a:t>Step-By-Step Instructions for </a:t>
             </a:r>
             <a:r>
-              <a:rPr lang="en-US" dirty="0" err="1" smtClean="0"/>
+              <a:rPr lang="en-US" dirty="0" err="1"/>
               <a:t>Miniproject</a:t>
             </a:r>
             <a:r>
-              <a:rPr lang="en-US" dirty="0" smtClean="0"/>
+              <a:rPr lang="en-US" dirty="0"/>
               <a:t> 2</a:t>
             </a:r>
-            <a:endParaRPr lang="en-US" dirty="0"/>
           </a:p>
         </p:txBody>
       </p:sp>
@@ -2569,14 +2591,13 @@
               <a:t>Step-By-Step Instructions for </a:t>
             </a:r>
             <a:r>
-              <a:rPr lang="en-US" dirty="0" err="1" smtClean="0"/>
+              <a:rPr lang="en-US" dirty="0" err="1"/>
               <a:t>Miniproject</a:t>
             </a:r>
             <a:r>
-              <a:rPr lang="en-US" dirty="0" smtClean="0"/>
+              <a:rPr lang="en-US" dirty="0"/>
               <a:t> 2</a:t>
             </a:r>
-            <a:endParaRPr lang="en-US" dirty="0"/>
           </a:p>
         </p:txBody>
       </p:sp>
@@ -2680,14 +2701,13 @@
               <a:t>Step-By-Step Instructions for </a:t>
             </a:r>
             <a:r>
-              <a:rPr lang="en-US" dirty="0" err="1" smtClean="0"/>
+              <a:rPr lang="en-US" dirty="0" err="1"/>
               <a:t>Miniproject</a:t>
             </a:r>
             <a:r>
-              <a:rPr lang="en-US" dirty="0" smtClean="0"/>
+              <a:rPr lang="en-US" dirty="0"/>
               <a:t> 2</a:t>
             </a:r>
-            <a:endParaRPr lang="en-US" dirty="0"/>
           </a:p>
         </p:txBody>
       </p:sp>
@@ -2971,14 +2991,13 @@
               <a:t>Step-By-Step Instructions for </a:t>
             </a:r>
             <a:r>
-              <a:rPr lang="en-US" dirty="0" err="1" smtClean="0"/>
+              <a:rPr lang="en-US" dirty="0" err="1"/>
               <a:t>Miniproject</a:t>
             </a:r>
             <a:r>
-              <a:rPr lang="en-US" dirty="0" smtClean="0"/>
+              <a:rPr lang="en-US" dirty="0"/>
               <a:t> 2</a:t>
             </a:r>
-            <a:endParaRPr lang="en-US" dirty="0"/>
           </a:p>
         </p:txBody>
       </p:sp>
@@ -3239,14 +3258,13 @@
               <a:t>Step-By-Step Instructions for </a:t>
             </a:r>
             <a:r>
-              <a:rPr lang="en-US" dirty="0" err="1" smtClean="0"/>
+              <a:rPr lang="en-US" dirty="0" err="1"/>
               <a:t>Miniproject</a:t>
             </a:r>
             <a:r>
-              <a:rPr lang="en-US" dirty="0" smtClean="0"/>
+              <a:rPr lang="en-US" dirty="0"/>
               <a:t> 2</a:t>
             </a:r>
-            <a:endParaRPr lang="en-US" dirty="0"/>
           </a:p>
         </p:txBody>
       </p:sp>
@@ -3439,14 +3457,13 @@
               <a:t>Step-By-Step Instructions for </a:t>
             </a:r>
             <a:r>
-              <a:rPr lang="en-US" dirty="0" err="1" smtClean="0"/>
+              <a:rPr lang="en-US" dirty="0" err="1"/>
               <a:t>Miniproject</a:t>
             </a:r>
             <a:r>
-              <a:rPr lang="en-US" dirty="0" smtClean="0"/>
+              <a:rPr lang="en-US" dirty="0"/>
               <a:t> 2</a:t>
             </a:r>
-            <a:endParaRPr lang="en-US" dirty="0"/>
           </a:p>
         </p:txBody>
       </p:sp>
@@ -3815,13 +3832,8 @@
             </a:r>
             <a:r>
               <a:rPr lang="en-US" dirty="0"/>
-              <a:t> </a:t>
-            </a:r>
-            <a:r>
-              <a:rPr lang="en-US" dirty="0" smtClean="0"/>
-              <a:t>2</a:t>
-            </a:r>
-            <a:endParaRPr lang="en-US" dirty="0"/>
+              <a:t> 2</a:t>
+            </a:r>
           </a:p>
         </p:txBody>
       </p:sp>
@@ -3850,13 +3862,8 @@
             </a:r>
             <a:r>
               <a:rPr lang="en-US" dirty="0"/>
-              <a:t> </a:t>
-            </a:r>
-            <a:r>
-              <a:rPr lang="en-US" dirty="0" smtClean="0"/>
-              <a:t>2</a:t>
-            </a:r>
-            <a:endParaRPr lang="en-US" dirty="0"/>
+              <a:t> 2</a:t>
+            </a:r>
           </a:p>
         </p:txBody>
       </p:sp>
@@ -4017,14 +4024,13 @@
               <a:t>Step-By-Step Instructions for </a:t>
             </a:r>
             <a:r>
-              <a:rPr lang="en-US" dirty="0" err="1" smtClean="0"/>
+              <a:rPr lang="en-US" dirty="0" err="1"/>
               <a:t>Miniproject</a:t>
             </a:r>
             <a:r>
-              <a:rPr lang="en-US" dirty="0" smtClean="0"/>
+              <a:rPr lang="en-US" dirty="0"/>
               <a:t> 2</a:t>
             </a:r>
-            <a:endParaRPr lang="en-US" dirty="0"/>
           </a:p>
         </p:txBody>
       </p:sp>
@@ -4073,7 +4079,7 @@
           <a:graphicData uri="http://schemas.openxmlformats.org/presentationml/2006/ole">
             <mc:AlternateContent xmlns:mc="http://schemas.openxmlformats.org/markup-compatibility/2006">
               <mc:Choice xmlns:v="urn:schemas-microsoft-com:vml" Requires="v">
-                <p:oleObj spid="_x0000_s88172" name="Equation" r:id="rId3" imgW="647700" imgH="203200" progId="Equation.3">
+                <p:oleObj spid="_x0000_s5121" name="Equation" r:id="rId3" imgW="647700" imgH="203200" progId="Equation.3">
                   <p:embed/>
                 </p:oleObj>
               </mc:Choice>
@@ -4082,7 +4088,7 @@
                   <p:embed/>
                   <p:pic>
                     <p:nvPicPr>
-                      <p:cNvPr id="0" name=""/>
+                      <p:cNvPr id="8" name="Object 7"/>
                       <p:cNvPicPr/>
                       <p:nvPr/>
                     </p:nvPicPr>
@@ -4471,14 +4477,13 @@
               <a:t>Step-By-Step Instructions for </a:t>
             </a:r>
             <a:r>
-              <a:rPr lang="en-US" dirty="0" err="1" smtClean="0"/>
+              <a:rPr lang="en-US" dirty="0" err="1"/>
               <a:t>Miniproject</a:t>
             </a:r>
             <a:r>
-              <a:rPr lang="en-US" dirty="0" smtClean="0"/>
+              <a:rPr lang="en-US" dirty="0"/>
               <a:t> 2</a:t>
             </a:r>
-            <a:endParaRPr lang="en-US" dirty="0"/>
           </a:p>
         </p:txBody>
       </p:sp>
@@ -4527,7 +4532,7 @@
           <a:graphicData uri="http://schemas.openxmlformats.org/presentationml/2006/ole">
             <mc:AlternateContent xmlns:mc="http://schemas.openxmlformats.org/markup-compatibility/2006">
               <mc:Choice xmlns:v="urn:schemas-microsoft-com:vml" Requires="v">
-                <p:oleObj spid="_x0000_s89283" name="Equation" r:id="rId3" imgW="1104900" imgH="241300" progId="Equation.3">
+                <p:oleObj spid="_x0000_s6145" name="Equation" r:id="rId3" imgW="1104900" imgH="241300" progId="Equation.3">
                   <p:embed/>
                 </p:oleObj>
               </mc:Choice>
@@ -4536,7 +4541,7 @@
                   <p:embed/>
                   <p:pic>
                     <p:nvPicPr>
-                      <p:cNvPr id="0" name=""/>
+                      <p:cNvPr id="6" name="Object 5"/>
                       <p:cNvPicPr/>
                       <p:nvPr/>
                     </p:nvPicPr>
@@ -4584,7 +4589,7 @@
           <a:graphicData uri="http://schemas.openxmlformats.org/presentationml/2006/ole">
             <mc:AlternateContent xmlns:mc="http://schemas.openxmlformats.org/markup-compatibility/2006">
               <mc:Choice xmlns:v="urn:schemas-microsoft-com:vml" Requires="v">
-                <p:oleObj spid="_x0000_s89284" name="Equation" r:id="rId5" imgW="1130300" imgH="241300" progId="Equation.3">
+                <p:oleObj spid="_x0000_s6146" name="Equation" r:id="rId5" imgW="1130300" imgH="241300" progId="Equation.3">
                   <p:embed/>
                 </p:oleObj>
               </mc:Choice>
@@ -4593,7 +4598,7 @@
                   <p:embed/>
                   <p:pic>
                     <p:nvPicPr>
-                      <p:cNvPr id="0" name=""/>
+                      <p:cNvPr id="7" name="Object 6"/>
                       <p:cNvPicPr/>
                       <p:nvPr/>
                     </p:nvPicPr>
@@ -4819,14 +4824,13 @@
               <a:t>Step-By-Step Instructions for </a:t>
             </a:r>
             <a:r>
-              <a:rPr lang="en-US" dirty="0" err="1" smtClean="0"/>
+              <a:rPr lang="en-US" dirty="0" err="1"/>
               <a:t>Miniproject</a:t>
             </a:r>
             <a:r>
-              <a:rPr lang="en-US" dirty="0" smtClean="0"/>
+              <a:rPr lang="en-US" dirty="0"/>
               <a:t> 2</a:t>
             </a:r>
-            <a:endParaRPr lang="en-US" dirty="0"/>
           </a:p>
         </p:txBody>
       </p:sp>
@@ -4875,7 +4879,7 @@
           <a:graphicData uri="http://schemas.openxmlformats.org/presentationml/2006/ole">
             <mc:AlternateContent xmlns:mc="http://schemas.openxmlformats.org/markup-compatibility/2006">
               <mc:Choice xmlns:v="urn:schemas-microsoft-com:vml" Requires="v">
-                <p:oleObj spid="_x0000_s90301" name="Equation" r:id="rId3" imgW="1104900" imgH="241300" progId="Equation.3">
+                <p:oleObj spid="_x0000_s7169" name="Equation" r:id="rId3" imgW="1104900" imgH="241300" progId="Equation.3">
                   <p:embed/>
                 </p:oleObj>
               </mc:Choice>
@@ -4884,7 +4888,7 @@
                   <p:embed/>
                   <p:pic>
                     <p:nvPicPr>
-                      <p:cNvPr id="0" name=""/>
+                      <p:cNvPr id="14" name="Object 13"/>
                       <p:cNvPicPr/>
                       <p:nvPr/>
                     </p:nvPicPr>
@@ -4932,7 +4936,7 @@
           <a:graphicData uri="http://schemas.openxmlformats.org/presentationml/2006/ole">
             <mc:AlternateContent xmlns:mc="http://schemas.openxmlformats.org/markup-compatibility/2006">
               <mc:Choice xmlns:v="urn:schemas-microsoft-com:vml" Requires="v">
-                <p:oleObj spid="_x0000_s90302" name="Equation" r:id="rId5" imgW="1130300" imgH="241300" progId="Equation.3">
+                <p:oleObj spid="_x0000_s7170" name="Equation" r:id="rId5" imgW="1130300" imgH="241300" progId="Equation.3">
                   <p:embed/>
                 </p:oleObj>
               </mc:Choice>
@@ -4941,7 +4945,7 @@
                   <p:embed/>
                   <p:pic>
                     <p:nvPicPr>
-                      <p:cNvPr id="0" name=""/>
+                      <p:cNvPr id="15" name="Object 14"/>
                       <p:cNvPicPr/>
                       <p:nvPr/>
                     </p:nvPicPr>
@@ -5062,15 +5066,7 @@
           <a:p>
             <a:r>
               <a:rPr lang="en-US" sz="2400" dirty="0"/>
-              <a:t>The top D dimensions of matrix A </a:t>
-            </a:r>
-            <a:r>
-              <a:rPr lang="en-US" sz="2400" dirty="0" smtClean="0"/>
-              <a:t>define a </a:t>
-            </a:r>
-            <a:r>
-              <a:rPr lang="en-US" sz="2400" dirty="0"/>
-              <a:t>D-dim projection that best preserves the learned movie features V:</a:t>
+              <a:t>The top D dimensions of matrix A define a D-dim projection that best preserves the learned movie features V:</a:t>
             </a:r>
           </a:p>
           <a:p>
@@ -5156,14 +5152,13 @@
               <a:t>Step-By-Step Instructions for </a:t>
             </a:r>
             <a:r>
-              <a:rPr lang="en-US" dirty="0" err="1" smtClean="0"/>
+              <a:rPr lang="en-US" dirty="0" err="1"/>
               <a:t>Miniproject</a:t>
             </a:r>
             <a:r>
-              <a:rPr lang="en-US" dirty="0" smtClean="0"/>
+              <a:rPr lang="en-US" dirty="0"/>
               <a:t> 2</a:t>
             </a:r>
-            <a:endParaRPr lang="en-US" dirty="0"/>
           </a:p>
         </p:txBody>
       </p:sp>
@@ -5212,7 +5207,7 @@
           <a:graphicData uri="http://schemas.openxmlformats.org/presentationml/2006/ole">
             <mc:AlternateContent xmlns:mc="http://schemas.openxmlformats.org/markup-compatibility/2006">
               <mc:Choice xmlns:v="urn:schemas-microsoft-com:vml" Requires="v">
-                <p:oleObj spid="_x0000_s93265" name="Equation" r:id="rId3" imgW="952500" imgH="419100" progId="Equation.3">
+                <p:oleObj spid="_x0000_s8193" name="Equation" r:id="rId3" imgW="952500" imgH="419100" progId="Equation.3">
                   <p:embed/>
                 </p:oleObj>
               </mc:Choice>
@@ -5221,7 +5216,7 @@
                   <p:embed/>
                   <p:pic>
                     <p:nvPicPr>
-                      <p:cNvPr id="0" name=""/>
+                      <p:cNvPr id="6" name="Object 5"/>
                       <p:cNvPicPr/>
                       <p:nvPr/>
                     </p:nvPicPr>
@@ -5269,7 +5264,7 @@
           <a:graphicData uri="http://schemas.openxmlformats.org/presentationml/2006/ole">
             <mc:AlternateContent xmlns:mc="http://schemas.openxmlformats.org/markup-compatibility/2006">
               <mc:Choice xmlns:v="urn:schemas-microsoft-com:vml" Requires="v">
-                <p:oleObj spid="_x0000_s93266" name="Equation" r:id="rId5" imgW="635000" imgH="254000" progId="Equation.3">
+                <p:oleObj spid="_x0000_s8194" name="Equation" r:id="rId5" imgW="635000" imgH="254000" progId="Equation.3">
                   <p:embed/>
                 </p:oleObj>
               </mc:Choice>
@@ -5278,7 +5273,7 @@
                   <p:embed/>
                   <p:pic>
                     <p:nvPicPr>
-                      <p:cNvPr id="0" name=""/>
+                      <p:cNvPr id="7" name="Object 6"/>
                       <p:cNvPicPr/>
                       <p:nvPr/>
                     </p:nvPicPr>
@@ -5528,14 +5523,13 @@
               <a:t>Step-By-Step Instructions for </a:t>
             </a:r>
             <a:r>
-              <a:rPr lang="en-US" dirty="0" err="1" smtClean="0"/>
+              <a:rPr lang="en-US" dirty="0" err="1"/>
               <a:t>Miniproject</a:t>
             </a:r>
             <a:r>
-              <a:rPr lang="en-US" dirty="0" smtClean="0"/>
+              <a:rPr lang="en-US" dirty="0"/>
               <a:t> 2</a:t>
             </a:r>
-            <a:endParaRPr lang="en-US" dirty="0"/>
           </a:p>
         </p:txBody>
       </p:sp>
@@ -5723,14 +5717,13 @@
               <a:t>Step-By-Step Instructions for </a:t>
             </a:r>
             <a:r>
-              <a:rPr lang="en-US" dirty="0" err="1" smtClean="0"/>
+              <a:rPr lang="en-US" dirty="0" err="1"/>
               <a:t>Miniproject</a:t>
             </a:r>
             <a:r>
-              <a:rPr lang="en-US" dirty="0" smtClean="0"/>
+              <a:rPr lang="en-US" dirty="0"/>
               <a:t> 2</a:t>
             </a:r>
-            <a:endParaRPr lang="en-US" dirty="0"/>
           </a:p>
         </p:txBody>
       </p:sp>
@@ -5972,14 +5965,13 @@
               <a:t>Step-By-Step Instructions for </a:t>
             </a:r>
             <a:r>
-              <a:rPr lang="en-US" dirty="0" err="1" smtClean="0"/>
+              <a:rPr lang="en-US" dirty="0" err="1"/>
               <a:t>Miniproject</a:t>
             </a:r>
             <a:r>
-              <a:rPr lang="en-US" dirty="0" smtClean="0"/>
+              <a:rPr lang="en-US" dirty="0"/>
               <a:t> 2</a:t>
             </a:r>
-            <a:endParaRPr lang="en-US" dirty="0"/>
           </a:p>
         </p:txBody>
       </p:sp>
@@ -6456,13 +6448,8 @@
             </a:r>
             <a:r>
               <a:rPr lang="en-US" dirty="0"/>
-              <a:t> </a:t>
-            </a:r>
-            <a:r>
-              <a:rPr lang="en-US" dirty="0" smtClean="0"/>
-              <a:t>2</a:t>
-            </a:r>
-            <a:endParaRPr lang="en-US" dirty="0"/>
+              <a:t> 2</a:t>
+            </a:r>
           </a:p>
         </p:txBody>
       </p:sp>
@@ -7032,14 +7019,13 @@
               <a:t>Step-By-Step Instructions for </a:t>
             </a:r>
             <a:r>
-              <a:rPr lang="en-US" dirty="0" err="1" smtClean="0"/>
+              <a:rPr lang="en-US" dirty="0" err="1"/>
               <a:t>Miniproject</a:t>
             </a:r>
             <a:r>
-              <a:rPr lang="en-US" dirty="0" smtClean="0"/>
+              <a:rPr lang="en-US" dirty="0"/>
               <a:t> 2</a:t>
             </a:r>
-            <a:endParaRPr lang="en-US" dirty="0"/>
           </a:p>
         </p:txBody>
       </p:sp>
@@ -7358,14 +7344,13 @@
               <a:t>Step-By-Step Instructions for </a:t>
             </a:r>
             <a:r>
-              <a:rPr lang="en-US" dirty="0" err="1" smtClean="0"/>
+              <a:rPr lang="en-US" dirty="0" err="1"/>
               <a:t>Miniproject</a:t>
             </a:r>
             <a:r>
-              <a:rPr lang="en-US" dirty="0" smtClean="0"/>
+              <a:rPr lang="en-US" dirty="0"/>
               <a:t> 2</a:t>
             </a:r>
-            <a:endParaRPr lang="en-US" dirty="0"/>
           </a:p>
         </p:txBody>
       </p:sp>
@@ -7499,14 +7484,13 @@
               <a:t>Step-By-Step Instructions for </a:t>
             </a:r>
             <a:r>
-              <a:rPr lang="en-US" dirty="0" err="1" smtClean="0"/>
+              <a:rPr lang="en-US" dirty="0" err="1"/>
               <a:t>Miniproject</a:t>
             </a:r>
             <a:r>
-              <a:rPr lang="en-US" dirty="0" smtClean="0"/>
+              <a:rPr lang="en-US" dirty="0"/>
               <a:t> 2</a:t>
             </a:r>
-            <a:endParaRPr lang="en-US" dirty="0"/>
           </a:p>
         </p:txBody>
       </p:sp>
@@ -7555,7 +7539,7 @@
           <a:graphicData uri="http://schemas.openxmlformats.org/presentationml/2006/ole">
             <mc:AlternateContent xmlns:mc="http://schemas.openxmlformats.org/markup-compatibility/2006">
               <mc:Choice xmlns:v="urn:schemas-microsoft-com:vml" Requires="v">
-                <p:oleObj spid="_x0000_s1139" name="Equation" r:id="rId3" imgW="2590560" imgH="431640" progId="Equation.3">
+                <p:oleObj spid="_x0000_s1025" name="Equation" r:id="rId3" imgW="2590560" imgH="431640" progId="Equation.3">
                   <p:embed/>
                 </p:oleObj>
               </mc:Choice>
@@ -7564,7 +7548,7 @@
                   <p:embed/>
                   <p:pic>
                     <p:nvPicPr>
-                      <p:cNvPr id="0" name=""/>
+                      <p:cNvPr id="6" name="Object 5"/>
                       <p:cNvPicPr/>
                       <p:nvPr/>
                     </p:nvPicPr>
@@ -7958,14 +7942,13 @@
               <a:t>Step-By-Step Instructions for </a:t>
             </a:r>
             <a:r>
-              <a:rPr lang="en-US" dirty="0" err="1" smtClean="0"/>
+              <a:rPr lang="en-US" dirty="0" err="1"/>
               <a:t>Miniproject</a:t>
             </a:r>
             <a:r>
-              <a:rPr lang="en-US" dirty="0" smtClean="0"/>
+              <a:rPr lang="en-US" dirty="0"/>
               <a:t> 2</a:t>
             </a:r>
-            <a:endParaRPr lang="en-US" dirty="0"/>
           </a:p>
         </p:txBody>
       </p:sp>
@@ -8125,14 +8108,13 @@
               <a:t>Step-By-Step Instructions for </a:t>
             </a:r>
             <a:r>
-              <a:rPr lang="en-US" dirty="0" err="1" smtClean="0"/>
+              <a:rPr lang="en-US" dirty="0" err="1"/>
               <a:t>Miniproject</a:t>
             </a:r>
             <a:r>
-              <a:rPr lang="en-US" dirty="0" smtClean="0"/>
+              <a:rPr lang="en-US" dirty="0"/>
               <a:t> 2</a:t>
             </a:r>
-            <a:endParaRPr lang="en-US" dirty="0"/>
           </a:p>
         </p:txBody>
       </p:sp>
@@ -8168,20 +8150,20 @@
           <p:nvPr>
             <p:extLst>
               <p:ext uri="{D42A27DB-BD31-4B8C-83A1-F6EECF244321}">
-                <p14:modId xmlns:p14="http://schemas.microsoft.com/office/powerpoint/2010/main" val="2608862813"/>
+                <p14:modId xmlns:p14="http://schemas.microsoft.com/office/powerpoint/2010/main" val="2427048915"/>
               </p:ext>
             </p:extLst>
           </p:nvPr>
         </p:nvGraphicFramePr>
         <p:xfrm>
-          <a:off x="1584325" y="1962150"/>
+          <a:off x="1452207" y="2008657"/>
           <a:ext cx="6478588" cy="877888"/>
         </p:xfrm>
         <a:graphic>
           <a:graphicData uri="http://schemas.openxmlformats.org/presentationml/2006/ole">
             <mc:AlternateContent xmlns:mc="http://schemas.openxmlformats.org/markup-compatibility/2006">
               <mc:Choice xmlns:v="urn:schemas-microsoft-com:vml" Requires="v">
-                <p:oleObj spid="_x0000_s91213" name="Equation" r:id="rId3" imgW="3187440" imgH="431640" progId="Equation.3">
+                <p:oleObj spid="_x0000_s2049" name="Equation" r:id="rId3" imgW="3187440" imgH="431640" progId="Equation.3">
                   <p:embed/>
                 </p:oleObj>
               </mc:Choice>
@@ -8190,7 +8172,7 @@
                   <p:embed/>
                   <p:pic>
                     <p:nvPicPr>
-                      <p:cNvPr id="0" name=""/>
+                      <p:cNvPr id="6" name="Object 5"/>
                       <p:cNvPicPr/>
                       <p:nvPr/>
                     </p:nvPicPr>
@@ -8202,7 +8184,7 @@
                     </p:blipFill>
                     <p:spPr>
                       <a:xfrm>
-                        <a:off x="1584325" y="1962150"/>
+                        <a:off x="1452207" y="2008657"/>
                         <a:ext cx="6478588" cy="877888"/>
                       </a:xfrm>
                       <a:prstGeom prst="rect">
@@ -8625,13 +8607,8 @@
           <a:p>
             <a:r>
               <a:rPr lang="en-US" sz="2400" dirty="0"/>
-              <a:t>Should be an option that you can turn on in many off-the-shelf </a:t>
-            </a:r>
-            <a:r>
-              <a:rPr lang="en-US" sz="2400" dirty="0" smtClean="0"/>
-              <a:t>implementations – however, for the second factorization method, you should implement this yourself</a:t>
-            </a:r>
-            <a:endParaRPr lang="en-US" sz="2400" dirty="0"/>
+              <a:t>Should be an option that you can turn on in many off-the-shelf implementations – however, for the second factorization method, you should implement this yourself</a:t>
+            </a:r>
           </a:p>
         </p:txBody>
       </p:sp>
@@ -8655,14 +8632,13 @@
               <a:t>Step-By-Step Instructions for </a:t>
             </a:r>
             <a:r>
-              <a:rPr lang="en-US" dirty="0" err="1" smtClean="0"/>
+              <a:rPr lang="en-US" dirty="0" err="1"/>
               <a:t>Miniproject</a:t>
             </a:r>
             <a:r>
-              <a:rPr lang="en-US" dirty="0" smtClean="0"/>
+              <a:rPr lang="en-US" dirty="0"/>
               <a:t> 2</a:t>
             </a:r>
-            <a:endParaRPr lang="en-US" dirty="0"/>
           </a:p>
         </p:txBody>
       </p:sp>
@@ -8711,7 +8687,7 @@
           <a:graphicData uri="http://schemas.openxmlformats.org/presentationml/2006/ole">
             <mc:AlternateContent xmlns:mc="http://schemas.openxmlformats.org/markup-compatibility/2006">
               <mc:Choice xmlns:v="urn:schemas-microsoft-com:vml" Requires="v">
-                <p:oleObj spid="_x0000_s97299" name="Equation" r:id="rId3" imgW="4228920" imgH="431640" progId="Equation.3">
+                <p:oleObj spid="_x0000_s3073" name="Equation" r:id="rId3" imgW="4228920" imgH="431640" progId="Equation.3">
                   <p:embed/>
                 </p:oleObj>
               </mc:Choice>
@@ -8720,7 +8696,7 @@
                   <p:embed/>
                   <p:pic>
                     <p:nvPicPr>
-                      <p:cNvPr id="0" name=""/>
+                      <p:cNvPr id="6" name="Object 5"/>
                       <p:cNvPicPr/>
                       <p:nvPr/>
                     </p:nvPicPr>
@@ -9224,14 +9200,13 @@
               <a:t>Step-By-Step Instructions for </a:t>
             </a:r>
             <a:r>
-              <a:rPr lang="en-US" dirty="0" err="1" smtClean="0"/>
+              <a:rPr lang="en-US" dirty="0" err="1"/>
               <a:t>Miniproject</a:t>
             </a:r>
             <a:r>
-              <a:rPr lang="en-US" dirty="0" smtClean="0"/>
+              <a:rPr lang="en-US" dirty="0"/>
               <a:t> 2</a:t>
             </a:r>
-            <a:endParaRPr lang="en-US" dirty="0"/>
           </a:p>
         </p:txBody>
       </p:sp>
@@ -9304,7 +9279,7 @@
           <a:graphicData uri="http://schemas.openxmlformats.org/presentationml/2006/ole">
             <mc:AlternateContent xmlns:mc="http://schemas.openxmlformats.org/markup-compatibility/2006">
               <mc:Choice xmlns:v="urn:schemas-microsoft-com:vml" Requires="v">
-                <p:oleObj spid="_x0000_s92268" name="Equation" r:id="rId4" imgW="622300" imgH="254000" progId="Equation.3">
+                <p:oleObj spid="_x0000_s4097" name="Equation" r:id="rId4" imgW="622300" imgH="254000" progId="Equation.3">
                   <p:embed/>
                 </p:oleObj>
               </mc:Choice>
@@ -9313,7 +9288,7 @@
                   <p:embed/>
                   <p:pic>
                     <p:nvPicPr>
-                      <p:cNvPr id="0" name=""/>
+                      <p:cNvPr id="7" name="Object 6"/>
                       <p:cNvPicPr/>
                       <p:nvPr/>
                     </p:nvPicPr>
@@ -9361,7 +9336,7 @@
           <a:graphicData uri="http://schemas.openxmlformats.org/presentationml/2006/ole">
             <mc:AlternateContent xmlns:mc="http://schemas.openxmlformats.org/markup-compatibility/2006">
               <mc:Choice xmlns:v="urn:schemas-microsoft-com:vml" Requires="v">
-                <p:oleObj spid="_x0000_s92269" name="Equation" r:id="rId6" imgW="1117600" imgH="254000" progId="Equation.3">
+                <p:oleObj spid="_x0000_s4098" name="Equation" r:id="rId6" imgW="1117600" imgH="254000" progId="Equation.3">
                   <p:embed/>
                 </p:oleObj>
               </mc:Choice>
@@ -9370,7 +9345,7 @@
                   <p:embed/>
                   <p:pic>
                     <p:nvPicPr>
-                      <p:cNvPr id="0" name=""/>
+                      <p:cNvPr id="8" name="Object 7"/>
                       <p:cNvPicPr/>
                       <p:nvPr/>
                     </p:nvPicPr>

</xml_diff>